<commit_message>
PPT and removed prefetch
</commit_message>
<xml_diff>
--- a/Presentation/Service Bus Integration Patterns.pptx
+++ b/Presentation/Service Bus Integration Patterns.pptx
@@ -4829,37 +4829,37 @@
     </dgm:pt>
   </dgm:ptLst>
   <dgm:cxnLst>
-    <dgm:cxn modelId="{AB9DB3A5-5590-4E9C-9842-5405E6CF13F0}" type="presOf" srcId="{6745F2E8-67DC-4335-8E1C-679A2BFBCEFE}" destId="{71D3D0C1-943C-4F07-851A-449A1ADF9B3C}" srcOrd="0" destOrd="2" presId="urn:microsoft.com/office/officeart/2005/8/layout/chevron2"/>
-    <dgm:cxn modelId="{C38A1DA9-FAA7-4B23-96C6-9B97DE30C034}" srcId="{319E2ED7-DAC0-475E-B7F4-31BD7A5B9166}" destId="{F3A0DCE0-1827-4396-86EA-CE2CE12F9D36}" srcOrd="1" destOrd="0" parTransId="{65C220AC-EF34-4407-8318-2323032CFC57}" sibTransId="{4D13DBEA-1863-4957-B43B-0CEA33DD4996}"/>
-    <dgm:cxn modelId="{5A3CCCB0-5C1A-40F0-81AD-EAF17766D25C}" type="presOf" srcId="{82A2100F-ACB1-4FB2-B588-2162CCE0A7EC}" destId="{8674861C-641D-4B44-BD65-87448F1A2F8A}" srcOrd="0" destOrd="0" presId="urn:microsoft.com/office/officeart/2005/8/layout/chevron2"/>
+    <dgm:cxn modelId="{A5E51451-6E88-48DB-A240-790D5FA94F8A}" type="presOf" srcId="{80DCC2D2-3070-4990-A0A3-FA99AE8150F5}" destId="{60455C74-C246-4F94-8A82-2C5DD1F99D9A}" srcOrd="0" destOrd="0" presId="urn:microsoft.com/office/officeart/2005/8/layout/chevron2"/>
+    <dgm:cxn modelId="{0156D289-FDAF-436A-ADC8-8BF401A3AFDF}" srcId="{6FB126C9-4DE9-466A-B25B-AC57AA36B4A8}" destId="{BD6249E7-E59F-420E-90E7-D89DF77960D0}" srcOrd="0" destOrd="0" parTransId="{72ECA2AB-80D3-4120-93AC-4A3A0B1A50E4}" sibTransId="{3D2EB8CD-822F-4467-A724-DE73741EC2A7}"/>
     <dgm:cxn modelId="{937E19B7-67CE-431E-AD3C-02EC700B10A8}" srcId="{82A2100F-ACB1-4FB2-B588-2162CCE0A7EC}" destId="{6745F2E8-67DC-4335-8E1C-679A2BFBCEFE}" srcOrd="2" destOrd="0" parTransId="{94CEB101-BF41-42F2-B6D5-387205ED63AB}" sibTransId="{90453888-4146-41D3-A757-3D9733F25949}"/>
     <dgm:cxn modelId="{E132ABBC-668B-45BD-B402-BBCB88C5A8E8}" srcId="{F3A0DCE0-1827-4396-86EA-CE2CE12F9D36}" destId="{80DCC2D2-3070-4990-A0A3-FA99AE8150F5}" srcOrd="0" destOrd="0" parTransId="{007BD878-4004-4572-A992-A588EF137BCF}" sibTransId="{28B37EDA-043F-4FE9-A0B0-7A7B86287260}"/>
+    <dgm:cxn modelId="{C38A1DA9-FAA7-4B23-96C6-9B97DE30C034}" srcId="{319E2ED7-DAC0-475E-B7F4-31BD7A5B9166}" destId="{F3A0DCE0-1827-4396-86EA-CE2CE12F9D36}" srcOrd="1" destOrd="0" parTransId="{65C220AC-EF34-4407-8318-2323032CFC57}" sibTransId="{4D13DBEA-1863-4957-B43B-0CEA33DD4996}"/>
+    <dgm:cxn modelId="{B73A275F-7945-483C-8FE0-7D9EA16D1BBA}" srcId="{D957C335-3589-4AA0-920B-00DB91C683BF}" destId="{82B52429-3E42-43BB-8391-EEA5D69683A3}" srcOrd="1" destOrd="0" parTransId="{F1DE50FC-DC8F-4E5C-9D47-D6BA187B7FD3}" sibTransId="{9C83342E-B54D-4BD5-A4BD-29FC60D70700}"/>
     <dgm:cxn modelId="{D3ABFCD0-354F-4D9A-9F0C-4B9AAB7DD4B8}" type="presOf" srcId="{75A8AF5E-E077-421B-9B83-1D16FC13CC3E}" destId="{C4A35548-2E21-4AAA-AE63-C60FCAEA2D26}" srcOrd="0" destOrd="0" presId="urn:microsoft.com/office/officeart/2005/8/layout/chevron2"/>
+    <dgm:cxn modelId="{AB9DB3A5-5590-4E9C-9842-5405E6CF13F0}" type="presOf" srcId="{6745F2E8-67DC-4335-8E1C-679A2BFBCEFE}" destId="{71D3D0C1-943C-4F07-851A-449A1ADF9B3C}" srcOrd="0" destOrd="2" presId="urn:microsoft.com/office/officeart/2005/8/layout/chevron2"/>
+    <dgm:cxn modelId="{F5F196BB-E062-4666-ADBF-28AB8EB88591}" type="presOf" srcId="{D957C335-3589-4AA0-920B-00DB91C683BF}" destId="{30D1CCFE-B9E2-495C-A14E-C264FE155CBE}" srcOrd="0" destOrd="0" presId="urn:microsoft.com/office/officeart/2005/8/layout/chevron2"/>
+    <dgm:cxn modelId="{D5C16949-916C-47D2-B666-403C11A53BDC}" type="presOf" srcId="{A65BB76B-6769-4336-B9A5-2CC4F1A9DF53}" destId="{635E652E-FF37-4DFF-95CD-8CA4BA2A8607}" srcOrd="0" destOrd="3" presId="urn:microsoft.com/office/officeart/2005/8/layout/chevron2"/>
+    <dgm:cxn modelId="{6B3599BA-0B84-42CB-98FF-A8C2B52E0768}" type="presOf" srcId="{F3A0DCE0-1827-4396-86EA-CE2CE12F9D36}" destId="{102D82BB-39D2-4FFB-89DC-E3A041C3A531}" srcOrd="0" destOrd="0" presId="urn:microsoft.com/office/officeart/2005/8/layout/chevron2"/>
+    <dgm:cxn modelId="{D50DC970-44E6-4A6B-BC93-08B01EE820A4}" type="presOf" srcId="{BD6249E7-E59F-420E-90E7-D89DF77960D0}" destId="{635E652E-FF37-4DFF-95CD-8CA4BA2A8607}" srcOrd="0" destOrd="0" presId="urn:microsoft.com/office/officeart/2005/8/layout/chevron2"/>
+    <dgm:cxn modelId="{C79B078C-D58A-47CF-94B0-7E387B47895B}" srcId="{6FB126C9-4DE9-466A-B25B-AC57AA36B4A8}" destId="{9CB56806-528A-44C1-B476-9B43D6E887C0}" srcOrd="2" destOrd="0" parTransId="{DFF6BF32-45C2-4942-B6C7-2656E49203DD}" sibTransId="{74CBDB70-6C77-4F6B-8303-DE1F7A3314B4}"/>
+    <dgm:cxn modelId="{C1F94BDE-4A9C-4F43-8E28-AA89E109CBB5}" type="presOf" srcId="{08471830-FB56-47BF-8120-388DF827F600}" destId="{71D3D0C1-943C-4F07-851A-449A1ADF9B3C}" srcOrd="0" destOrd="1" presId="urn:microsoft.com/office/officeart/2005/8/layout/chevron2"/>
+    <dgm:cxn modelId="{5A3CCCB0-5C1A-40F0-81AD-EAF17766D25C}" type="presOf" srcId="{82A2100F-ACB1-4FB2-B588-2162CCE0A7EC}" destId="{8674861C-641D-4B44-BD65-87448F1A2F8A}" srcOrd="0" destOrd="0" presId="urn:microsoft.com/office/officeart/2005/8/layout/chevron2"/>
     <dgm:cxn modelId="{0C011E99-7026-471C-BBF2-F84393EF524F}" type="presOf" srcId="{A708CE05-6319-459B-AF29-396B7BABF599}" destId="{60455C74-C246-4F94-8A82-2C5DD1F99D9A}" srcOrd="0" destOrd="1" presId="urn:microsoft.com/office/officeart/2005/8/layout/chevron2"/>
-    <dgm:cxn modelId="{0F152CF0-FE4F-41C3-AD79-1103EE14CB26}" type="presOf" srcId="{BBBFE2C6-6943-42DD-A5DD-D6818DA7D418}" destId="{635E652E-FF37-4DFF-95CD-8CA4BA2A8607}" srcOrd="0" destOrd="1" presId="urn:microsoft.com/office/officeart/2005/8/layout/chevron2"/>
-    <dgm:cxn modelId="{47B03B05-419C-4EC6-96AF-A7685A8981D5}" type="presOf" srcId="{F62940DA-37A4-4D07-ACF2-0CEA7AC91757}" destId="{71D3D0C1-943C-4F07-851A-449A1ADF9B3C}" srcOrd="0" destOrd="0" presId="urn:microsoft.com/office/officeart/2005/8/layout/chevron2"/>
-    <dgm:cxn modelId="{C79B078C-D58A-47CF-94B0-7E387B47895B}" srcId="{6FB126C9-4DE9-466A-B25B-AC57AA36B4A8}" destId="{9CB56806-528A-44C1-B476-9B43D6E887C0}" srcOrd="2" destOrd="0" parTransId="{DFF6BF32-45C2-4942-B6C7-2656E49203DD}" sibTransId="{74CBDB70-6C77-4F6B-8303-DE1F7A3314B4}"/>
-    <dgm:cxn modelId="{986B3B8B-DE94-4ECB-8BEB-53DE5AD5C2FF}" type="presOf" srcId="{82B52429-3E42-43BB-8391-EEA5D69683A3}" destId="{C4A35548-2E21-4AAA-AE63-C60FCAEA2D26}" srcOrd="0" destOrd="1" presId="urn:microsoft.com/office/officeart/2005/8/layout/chevron2"/>
+    <dgm:cxn modelId="{60F36FC5-56E2-4EBB-89A6-7FBC4B31009C}" srcId="{6FB126C9-4DE9-466A-B25B-AC57AA36B4A8}" destId="{A65BB76B-6769-4336-B9A5-2CC4F1A9DF53}" srcOrd="3" destOrd="0" parTransId="{8149FB2C-C327-43F1-A0EF-E84067A22E2B}" sibTransId="{46D0B279-62B2-49C7-A4EC-E7C64778DCBB}"/>
+    <dgm:cxn modelId="{5B94BBC2-A917-4F14-BBAF-71CDA57D6E46}" srcId="{319E2ED7-DAC0-475E-B7F4-31BD7A5B9166}" destId="{D957C335-3589-4AA0-920B-00DB91C683BF}" srcOrd="0" destOrd="0" parTransId="{C09C0A58-B08D-4AD8-92AE-2C0B81B850CB}" sibTransId="{BED980AE-90CC-4293-8282-401B45C67475}"/>
+    <dgm:cxn modelId="{7984A512-A146-4663-A47E-6ADCB4FA6DF7}" srcId="{319E2ED7-DAC0-475E-B7F4-31BD7A5B9166}" destId="{82A2100F-ACB1-4FB2-B588-2162CCE0A7EC}" srcOrd="2" destOrd="0" parTransId="{D4ED4BAD-3900-46F1-AF51-98F72F7DCE07}" sibTransId="{7D54EAF5-9F72-4894-A745-4C7830259640}"/>
+    <dgm:cxn modelId="{19D571CD-0211-4F28-9B70-3EC482B38A8B}" srcId="{F3A0DCE0-1827-4396-86EA-CE2CE12F9D36}" destId="{A708CE05-6319-459B-AF29-396B7BABF599}" srcOrd="1" destOrd="0" parTransId="{2B611304-A126-4569-A435-254CF83B542A}" sibTransId="{43CC4F85-88DC-45E3-B283-6055E213FF83}"/>
     <dgm:cxn modelId="{81DA24D7-97CE-438F-B852-BF9BF348C0B3}" srcId="{D957C335-3589-4AA0-920B-00DB91C683BF}" destId="{75A8AF5E-E077-421B-9B83-1D16FC13CC3E}" srcOrd="0" destOrd="0" parTransId="{6DC162DF-BB4B-4EED-8F82-97B9EA69275B}" sibTransId="{99D8C5BF-696F-4C46-B987-D4C950E716F2}"/>
-    <dgm:cxn modelId="{BCE2E609-F5FD-4D47-8044-B2D3C24E44D5}" srcId="{6FB126C9-4DE9-466A-B25B-AC57AA36B4A8}" destId="{BBBFE2C6-6943-42DD-A5DD-D6818DA7D418}" srcOrd="1" destOrd="0" parTransId="{F777CEEA-C19F-453B-8807-1F928AEC03EC}" sibTransId="{18226821-D713-4B27-947C-0725DE36937B}"/>
-    <dgm:cxn modelId="{0156D289-FDAF-436A-ADC8-8BF401A3AFDF}" srcId="{6FB126C9-4DE9-466A-B25B-AC57AA36B4A8}" destId="{BD6249E7-E59F-420E-90E7-D89DF77960D0}" srcOrd="0" destOrd="0" parTransId="{72ECA2AB-80D3-4120-93AC-4A3A0B1A50E4}" sibTransId="{3D2EB8CD-822F-4467-A724-DE73741EC2A7}"/>
-    <dgm:cxn modelId="{5B94BBC2-A917-4F14-BBAF-71CDA57D6E46}" srcId="{319E2ED7-DAC0-475E-B7F4-31BD7A5B9166}" destId="{D957C335-3589-4AA0-920B-00DB91C683BF}" srcOrd="0" destOrd="0" parTransId="{C09C0A58-B08D-4AD8-92AE-2C0B81B850CB}" sibTransId="{BED980AE-90CC-4293-8282-401B45C67475}"/>
-    <dgm:cxn modelId="{2EE161C4-F368-49DA-9263-5565E17AC390}" srcId="{82A2100F-ACB1-4FB2-B588-2162CCE0A7EC}" destId="{F62940DA-37A4-4D07-ACF2-0CEA7AC91757}" srcOrd="0" destOrd="0" parTransId="{4125334E-F82D-4AB7-9A28-90E8DCDE2637}" sibTransId="{62D9652E-9BE8-4476-A4C5-58D32663BA67}"/>
-    <dgm:cxn modelId="{7984A512-A146-4663-A47E-6ADCB4FA6DF7}" srcId="{319E2ED7-DAC0-475E-B7F4-31BD7A5B9166}" destId="{82A2100F-ACB1-4FB2-B588-2162CCE0A7EC}" srcOrd="2" destOrd="0" parTransId="{D4ED4BAD-3900-46F1-AF51-98F72F7DCE07}" sibTransId="{7D54EAF5-9F72-4894-A745-4C7830259640}"/>
     <dgm:cxn modelId="{B23F0335-5FA2-4792-9D39-CC7C8715EB40}" type="presOf" srcId="{6FB126C9-4DE9-466A-B25B-AC57AA36B4A8}" destId="{C6191146-B27E-4576-889C-63715DA6B13F}" srcOrd="0" destOrd="0" presId="urn:microsoft.com/office/officeart/2005/8/layout/chevron2"/>
     <dgm:cxn modelId="{063EB3C0-7438-4879-9E2E-E0F41B7FB189}" type="presOf" srcId="{9CB56806-528A-44C1-B476-9B43D6E887C0}" destId="{635E652E-FF37-4DFF-95CD-8CA4BA2A8607}" srcOrd="0" destOrd="2" presId="urn:microsoft.com/office/officeart/2005/8/layout/chevron2"/>
     <dgm:cxn modelId="{4EF8FF02-E84E-4A2A-BE64-590744BB1ECC}" srcId="{82A2100F-ACB1-4FB2-B588-2162CCE0A7EC}" destId="{08471830-FB56-47BF-8120-388DF827F600}" srcOrd="1" destOrd="0" parTransId="{81E2EC31-99EB-46A4-96E2-0EAFE8119909}" sibTransId="{30669AC3-1C30-4302-8714-BAE75147CD7B}"/>
-    <dgm:cxn modelId="{60F36FC5-56E2-4EBB-89A6-7FBC4B31009C}" srcId="{6FB126C9-4DE9-466A-B25B-AC57AA36B4A8}" destId="{A65BB76B-6769-4336-B9A5-2CC4F1A9DF53}" srcOrd="3" destOrd="0" parTransId="{8149FB2C-C327-43F1-A0EF-E84067A22E2B}" sibTransId="{46D0B279-62B2-49C7-A4EC-E7C64778DCBB}"/>
-    <dgm:cxn modelId="{A5E51451-6E88-48DB-A240-790D5FA94F8A}" type="presOf" srcId="{80DCC2D2-3070-4990-A0A3-FA99AE8150F5}" destId="{60455C74-C246-4F94-8A82-2C5DD1F99D9A}" srcOrd="0" destOrd="0" presId="urn:microsoft.com/office/officeart/2005/8/layout/chevron2"/>
-    <dgm:cxn modelId="{C1F94BDE-4A9C-4F43-8E28-AA89E109CBB5}" type="presOf" srcId="{08471830-FB56-47BF-8120-388DF827F600}" destId="{71D3D0C1-943C-4F07-851A-449A1ADF9B3C}" srcOrd="0" destOrd="1" presId="urn:microsoft.com/office/officeart/2005/8/layout/chevron2"/>
-    <dgm:cxn modelId="{19D571CD-0211-4F28-9B70-3EC482B38A8B}" srcId="{F3A0DCE0-1827-4396-86EA-CE2CE12F9D36}" destId="{A708CE05-6319-459B-AF29-396B7BABF599}" srcOrd="1" destOrd="0" parTransId="{2B611304-A126-4569-A435-254CF83B542A}" sibTransId="{43CC4F85-88DC-45E3-B283-6055E213FF83}"/>
-    <dgm:cxn modelId="{D5C16949-916C-47D2-B666-403C11A53BDC}" type="presOf" srcId="{A65BB76B-6769-4336-B9A5-2CC4F1A9DF53}" destId="{635E652E-FF37-4DFF-95CD-8CA4BA2A8607}" srcOrd="0" destOrd="3" presId="urn:microsoft.com/office/officeart/2005/8/layout/chevron2"/>
-    <dgm:cxn modelId="{F5F196BB-E062-4666-ADBF-28AB8EB88591}" type="presOf" srcId="{D957C335-3589-4AA0-920B-00DB91C683BF}" destId="{30D1CCFE-B9E2-495C-A14E-C264FE155CBE}" srcOrd="0" destOrd="0" presId="urn:microsoft.com/office/officeart/2005/8/layout/chevron2"/>
+    <dgm:cxn modelId="{2EE161C4-F368-49DA-9263-5565E17AC390}" srcId="{82A2100F-ACB1-4FB2-B588-2162CCE0A7EC}" destId="{F62940DA-37A4-4D07-ACF2-0CEA7AC91757}" srcOrd="0" destOrd="0" parTransId="{4125334E-F82D-4AB7-9A28-90E8DCDE2637}" sibTransId="{62D9652E-9BE8-4476-A4C5-58D32663BA67}"/>
+    <dgm:cxn modelId="{BCE2E609-F5FD-4D47-8044-B2D3C24E44D5}" srcId="{6FB126C9-4DE9-466A-B25B-AC57AA36B4A8}" destId="{BBBFE2C6-6943-42DD-A5DD-D6818DA7D418}" srcOrd="1" destOrd="0" parTransId="{F777CEEA-C19F-453B-8807-1F928AEC03EC}" sibTransId="{18226821-D713-4B27-947C-0725DE36937B}"/>
     <dgm:cxn modelId="{5BB7F946-2644-4866-993F-D37B265F39A2}" srcId="{319E2ED7-DAC0-475E-B7F4-31BD7A5B9166}" destId="{6FB126C9-4DE9-466A-B25B-AC57AA36B4A8}" srcOrd="3" destOrd="0" parTransId="{C899445F-DA4D-4276-9976-650356A15FAE}" sibTransId="{6B59BCFD-82F5-4EE5-BBA3-7C0C82963889}"/>
-    <dgm:cxn modelId="{D50DC970-44E6-4A6B-BC93-08B01EE820A4}" type="presOf" srcId="{BD6249E7-E59F-420E-90E7-D89DF77960D0}" destId="{635E652E-FF37-4DFF-95CD-8CA4BA2A8607}" srcOrd="0" destOrd="0" presId="urn:microsoft.com/office/officeart/2005/8/layout/chevron2"/>
     <dgm:cxn modelId="{236F0FB2-695E-473F-8749-D2910A11D1DE}" type="presOf" srcId="{319E2ED7-DAC0-475E-B7F4-31BD7A5B9166}" destId="{839CC9F4-E7D6-485F-85CD-EC9B7273AD54}" srcOrd="0" destOrd="0" presId="urn:microsoft.com/office/officeart/2005/8/layout/chevron2"/>
-    <dgm:cxn modelId="{B73A275F-7945-483C-8FE0-7D9EA16D1BBA}" srcId="{D957C335-3589-4AA0-920B-00DB91C683BF}" destId="{82B52429-3E42-43BB-8391-EEA5D69683A3}" srcOrd="1" destOrd="0" parTransId="{F1DE50FC-DC8F-4E5C-9D47-D6BA187B7FD3}" sibTransId="{9C83342E-B54D-4BD5-A4BD-29FC60D70700}"/>
-    <dgm:cxn modelId="{6B3599BA-0B84-42CB-98FF-A8C2B52E0768}" type="presOf" srcId="{F3A0DCE0-1827-4396-86EA-CE2CE12F9D36}" destId="{102D82BB-39D2-4FFB-89DC-E3A041C3A531}" srcOrd="0" destOrd="0" presId="urn:microsoft.com/office/officeart/2005/8/layout/chevron2"/>
+    <dgm:cxn modelId="{47B03B05-419C-4EC6-96AF-A7685A8981D5}" type="presOf" srcId="{F62940DA-37A4-4D07-ACF2-0CEA7AC91757}" destId="{71D3D0C1-943C-4F07-851A-449A1ADF9B3C}" srcOrd="0" destOrd="0" presId="urn:microsoft.com/office/officeart/2005/8/layout/chevron2"/>
+    <dgm:cxn modelId="{0F152CF0-FE4F-41C3-AD79-1103EE14CB26}" type="presOf" srcId="{BBBFE2C6-6943-42DD-A5DD-D6818DA7D418}" destId="{635E652E-FF37-4DFF-95CD-8CA4BA2A8607}" srcOrd="0" destOrd="1" presId="urn:microsoft.com/office/officeart/2005/8/layout/chevron2"/>
+    <dgm:cxn modelId="{986B3B8B-DE94-4ECB-8BEB-53DE5AD5C2FF}" type="presOf" srcId="{82B52429-3E42-43BB-8391-EEA5D69683A3}" destId="{C4A35548-2E21-4AAA-AE63-C60FCAEA2D26}" srcOrd="0" destOrd="1" presId="urn:microsoft.com/office/officeart/2005/8/layout/chevron2"/>
     <dgm:cxn modelId="{0BC5C6DE-C656-4E47-BA61-591C575E6077}" type="presParOf" srcId="{839CC9F4-E7D6-485F-85CD-EC9B7273AD54}" destId="{77F424D6-A675-4ED7-BDAE-10ED3676A257}" srcOrd="0" destOrd="0" presId="urn:microsoft.com/office/officeart/2005/8/layout/chevron2"/>
     <dgm:cxn modelId="{9101EB04-1918-4C7A-85FD-8E7CA447E70D}" type="presParOf" srcId="{77F424D6-A675-4ED7-BDAE-10ED3676A257}" destId="{30D1CCFE-B9E2-495C-A14E-C264FE155CBE}" srcOrd="0" destOrd="0" presId="urn:microsoft.com/office/officeart/2005/8/layout/chevron2"/>
     <dgm:cxn modelId="{69A24B12-64A0-4D47-B49B-A6AA6EB7AB85}" type="presParOf" srcId="{77F424D6-A675-4ED7-BDAE-10ED3676A257}" destId="{C4A35548-2E21-4AAA-AE63-C60FCAEA2D26}" srcOrd="1" destOrd="0" presId="urn:microsoft.com/office/officeart/2005/8/layout/chevron2"/>
@@ -6049,58 +6049,58 @@
     </dgm:pt>
   </dgm:ptLst>
   <dgm:cxnLst>
+    <dgm:cxn modelId="{18289599-A311-4051-9045-647C4837F979}" type="presOf" srcId="{9FA41D54-3C44-4829-B8AA-F8CCC8F6F5E8}" destId="{BE982601-11BC-4250-868C-A837261AAF8F}" srcOrd="0" destOrd="0" presId="urn:microsoft.com/office/officeart/2005/8/layout/hierarchy3"/>
+    <dgm:cxn modelId="{CC9E8E3D-1831-41E5-935D-C6B608516E24}" type="presOf" srcId="{4BA69AC7-8F33-4A12-BB23-8CBEF84AE135}" destId="{1BF05B23-31E5-4145-8F1D-9797DCBCA142}" srcOrd="0" destOrd="0" presId="urn:microsoft.com/office/officeart/2005/8/layout/hierarchy3"/>
+    <dgm:cxn modelId="{3B9D3584-1791-4DBA-9B5E-8BC33FFD910C}" srcId="{5C80EC14-A851-429A-9EF2-7FD38B0FCB58}" destId="{4BA69AC7-8F33-4A12-BB23-8CBEF84AE135}" srcOrd="2" destOrd="0" parTransId="{AEAB993F-D28E-473A-8ADE-C911C7044C94}" sibTransId="{CCC8B79D-75DE-4244-848D-CB150C8A7175}"/>
+    <dgm:cxn modelId="{1184BBF4-BA60-40FD-A90A-52847CEB3790}" type="presOf" srcId="{BDC5DD6A-FBC1-452C-BC24-39E295EAC0FA}" destId="{45C9E3B2-A04B-4DC6-809E-69771C933CAA}" srcOrd="0" destOrd="0" presId="urn:microsoft.com/office/officeart/2005/8/layout/hierarchy3"/>
+    <dgm:cxn modelId="{9DB5DDAF-25AE-4B59-AA5B-3A6AC85DF828}" type="presOf" srcId="{15272A79-60DF-40A4-B348-5BAB6C0BC3F5}" destId="{31A64678-7AC5-44A3-9918-A16B84986BB4}" srcOrd="0" destOrd="0" presId="urn:microsoft.com/office/officeart/2005/8/layout/hierarchy3"/>
+    <dgm:cxn modelId="{A0607FC2-BB43-45B4-B11E-4AB994B88C9E}" type="presOf" srcId="{FFD06E6D-CE14-440F-BF47-1763BFC2D015}" destId="{BCA81C53-7FE8-4D45-8C27-F68782FE2FBE}" srcOrd="0" destOrd="0" presId="urn:microsoft.com/office/officeart/2005/8/layout/hierarchy3"/>
+    <dgm:cxn modelId="{5DF9444B-F1D5-4E4D-9C97-F9021825D853}" srcId="{39FDA24F-138C-48E7-A432-3C3A029E108F}" destId="{5C80EC14-A851-429A-9EF2-7FD38B0FCB58}" srcOrd="2" destOrd="0" parTransId="{5FD6C2C4-50C3-425F-97C2-BF96E7F552B4}" sibTransId="{86CA18CE-D82C-4E25-9C73-1A1F7090ADBC}"/>
+    <dgm:cxn modelId="{927FA1E2-6399-463A-8AA7-FF30047E7B7B}" srcId="{5C80EC14-A851-429A-9EF2-7FD38B0FCB58}" destId="{F8F4FC1B-B140-4F14-82FF-36B85734F91B}" srcOrd="0" destOrd="0" parTransId="{E77B18D4-DBB3-4B4C-97DE-DDCCFACF5444}" sibTransId="{75F201D2-694C-4E76-A51F-D012EAF1D6F5}"/>
+    <dgm:cxn modelId="{7F129350-677D-4F64-B542-CCF694D1A43D}" type="presOf" srcId="{8346E337-662F-470B-9F93-1D76D4468326}" destId="{E57152C6-7A38-4611-8406-AA547F40C188}" srcOrd="0" destOrd="0" presId="urn:microsoft.com/office/officeart/2005/8/layout/hierarchy3"/>
+    <dgm:cxn modelId="{28210463-3BD2-4DBA-9B91-97F9CA5D0601}" type="presOf" srcId="{B2DD471D-D666-467A-8951-217EE2C5A09F}" destId="{CEB46391-533D-4055-9F38-D2F5B64EE6F8}" srcOrd="0" destOrd="0" presId="urn:microsoft.com/office/officeart/2005/8/layout/hierarchy3"/>
+    <dgm:cxn modelId="{9D31C92C-FB50-4B36-B4BD-11C11F05DF88}" srcId="{15272A79-60DF-40A4-B348-5BAB6C0BC3F5}" destId="{55CAD101-5EBD-40E8-8B5A-CAC19CD99886}" srcOrd="1" destOrd="0" parTransId="{0F7F6826-E5B7-476D-AE81-C581B5795770}" sibTransId="{3932FC0E-F4D0-4A04-A36F-BB3E6C1CD3FF}"/>
+    <dgm:cxn modelId="{F58B6068-ECE4-4C95-B585-6B52C4F3F35C}" srcId="{39FDA24F-138C-48E7-A432-3C3A029E108F}" destId="{17A6E45C-EE2A-4798-A06D-BA13D3842653}" srcOrd="1" destOrd="0" parTransId="{9C56D1A5-F407-4BFF-8891-1E4682B9A6BB}" sibTransId="{AFED61C5-C621-4DFA-971A-09B52789CDA5}"/>
+    <dgm:cxn modelId="{09F15249-5438-464D-8948-56FF98D2B1EF}" type="presOf" srcId="{5C80EC14-A851-429A-9EF2-7FD38B0FCB58}" destId="{3F25274A-31E6-4BF1-84FF-030C007C9A8E}" srcOrd="1" destOrd="0" presId="urn:microsoft.com/office/officeart/2005/8/layout/hierarchy3"/>
+    <dgm:cxn modelId="{C03A30AD-4A08-4FB8-B8A6-32C8726D2D8F}" type="presOf" srcId="{17A6E45C-EE2A-4798-A06D-BA13D3842653}" destId="{EA2398BB-27C2-4FC5-8E19-A4BAA978B73A}" srcOrd="0" destOrd="0" presId="urn:microsoft.com/office/officeart/2005/8/layout/hierarchy3"/>
+    <dgm:cxn modelId="{C0B5B93B-A92B-4949-AD96-B23CDA709C40}" srcId="{39FDA24F-138C-48E7-A432-3C3A029E108F}" destId="{BDC5DD6A-FBC1-452C-BC24-39E295EAC0FA}" srcOrd="3" destOrd="0" parTransId="{5570B5B0-FBDB-4EA6-A1E8-48FDA3363E9E}" sibTransId="{B58A1015-A8DA-4495-9952-030B07DD4AE6}"/>
+    <dgm:cxn modelId="{8DCCCF97-9BE1-41D2-A762-40B6362E744B}" type="presOf" srcId="{E6A33E8E-986C-4249-A22F-3BAB96789222}" destId="{3D76A59B-2757-4825-AF33-DD7D5CAFCA6B}" srcOrd="0" destOrd="0" presId="urn:microsoft.com/office/officeart/2005/8/layout/hierarchy3"/>
+    <dgm:cxn modelId="{D96FEDCA-4B78-41CC-B556-B3711445AC82}" type="presOf" srcId="{31A4B967-3DFF-43A0-A822-CF6D298BC388}" destId="{D5DCF584-2416-4841-8A19-70255E1ABC54}" srcOrd="0" destOrd="0" presId="urn:microsoft.com/office/officeart/2005/8/layout/hierarchy3"/>
+    <dgm:cxn modelId="{9374A8DD-8E69-467B-82E6-6021361A27A9}" srcId="{15272A79-60DF-40A4-B348-5BAB6C0BC3F5}" destId="{5D15E235-DCB4-4BA9-A04F-98873F0D1FF2}" srcOrd="2" destOrd="0" parTransId="{F01F5FED-312C-4C24-B701-8D3A60F0F6CD}" sibTransId="{63C42624-FBB5-4EBB-BCF3-B3802EEEFA07}"/>
+    <dgm:cxn modelId="{DDEA500C-77D6-4275-BCD4-12C46688332A}" type="presOf" srcId="{91152576-169B-40BE-8E62-7FF0BE953AEB}" destId="{3EA98D33-FBD9-47BF-AA9F-7A1AEC1706E9}" srcOrd="0" destOrd="0" presId="urn:microsoft.com/office/officeart/2005/8/layout/hierarchy3"/>
+    <dgm:cxn modelId="{CB04CE9E-FBB5-4E2F-ACF6-5DF3167F0A9F}" type="presOf" srcId="{3A814798-0F51-4369-A541-5218E9C84051}" destId="{2C1186A4-F3B3-4E48-A1A2-52FC1BAED6C8}" srcOrd="0" destOrd="0" presId="urn:microsoft.com/office/officeart/2005/8/layout/hierarchy3"/>
+    <dgm:cxn modelId="{98ABF0F2-CB5F-43A1-902C-EAFBA92A4090}" srcId="{BDC5DD6A-FBC1-452C-BC24-39E295EAC0FA}" destId="{C02B70D0-C3F9-4F66-A627-2F7D55ECD773}" srcOrd="1" destOrd="0" parTransId="{E6A33E8E-986C-4249-A22F-3BAB96789222}" sibTransId="{037DEE33-5B5D-4C93-B3D2-46717E4DD8FC}"/>
+    <dgm:cxn modelId="{DB8DFAB2-B2D9-48C1-903F-21C2B016DD99}" type="presOf" srcId="{145B9685-B495-41F8-B7E9-1AAB2FF5C287}" destId="{ECF08292-B0AA-4C0B-9B62-A7A6E9B67D01}" srcOrd="0" destOrd="0" presId="urn:microsoft.com/office/officeart/2005/8/layout/hierarchy3"/>
+    <dgm:cxn modelId="{B40B52F7-447E-4587-ADD7-78443446071E}" srcId="{39FDA24F-138C-48E7-A432-3C3A029E108F}" destId="{15272A79-60DF-40A4-B348-5BAB6C0BC3F5}" srcOrd="0" destOrd="0" parTransId="{3FA9233F-2BD0-4DBB-A7FF-DA82C3911C29}" sibTransId="{329467D4-12E3-4362-BBFB-B1478A101033}"/>
+    <dgm:cxn modelId="{C99CF8B0-2CD1-4DEE-9B66-4896DDF84CF5}" type="presOf" srcId="{E77B18D4-DBB3-4B4C-97DE-DDCCFACF5444}" destId="{0D4E001A-690B-4347-AA0B-CC209DA191F7}" srcOrd="0" destOrd="0" presId="urn:microsoft.com/office/officeart/2005/8/layout/hierarchy3"/>
+    <dgm:cxn modelId="{45933BFE-2CF1-474B-963E-902F09FB4A32}" type="presOf" srcId="{17A6E45C-EE2A-4798-A06D-BA13D3842653}" destId="{CD49FC6E-E5EE-43D6-A400-6877C924B49A}" srcOrd="1" destOrd="0" presId="urn:microsoft.com/office/officeart/2005/8/layout/hierarchy3"/>
+    <dgm:cxn modelId="{D02CA1F1-9459-4207-9BCB-277ED87C0D0F}" type="presOf" srcId="{55CAD101-5EBD-40E8-8B5A-CAC19CD99886}" destId="{15EC8C5A-02E9-4D4D-8441-4CFDE7C72B7D}" srcOrd="0" destOrd="0" presId="urn:microsoft.com/office/officeart/2005/8/layout/hierarchy3"/>
+    <dgm:cxn modelId="{A618DEBC-FEB3-4540-B820-B96623A3DD91}" srcId="{15272A79-60DF-40A4-B348-5BAB6C0BC3F5}" destId="{0FE8BEC8-EF9F-47A1-A35C-AE60F2A47E8F}" srcOrd="0" destOrd="0" parTransId="{31A4B967-3DFF-43A0-A822-CF6D298BC388}" sibTransId="{2D0C1090-4A44-4DAF-9A45-D94417BD7138}"/>
+    <dgm:cxn modelId="{08470EC9-7BD8-431B-839E-9C5DE67F5EBB}" srcId="{5C80EC14-A851-429A-9EF2-7FD38B0FCB58}" destId="{E004EAC3-892D-4D06-BCF4-0F7497CBAED7}" srcOrd="3" destOrd="0" parTransId="{145B9685-B495-41F8-B7E9-1AAB2FF5C287}" sibTransId="{6DE1D02F-2D74-4D83-8346-3CF652A1664E}"/>
+    <dgm:cxn modelId="{03D592AA-7635-4335-8323-3F58D1B1866E}" type="presOf" srcId="{0F7F6826-E5B7-476D-AE81-C581B5795770}" destId="{AB1F32A4-68AD-4F42-88E4-F15D6594CF80}" srcOrd="0" destOrd="0" presId="urn:microsoft.com/office/officeart/2005/8/layout/hierarchy3"/>
+    <dgm:cxn modelId="{19B1A30A-7E2F-4D91-A3EA-ED36411045E0}" srcId="{17A6E45C-EE2A-4798-A06D-BA13D3842653}" destId="{9FA41D54-3C44-4829-B8AA-F8CCC8F6F5E8}" srcOrd="1" destOrd="0" parTransId="{3A814798-0F51-4369-A541-5218E9C84051}" sibTransId="{C23DDEF2-18C6-41A9-B7ED-CCBF4840C2A0}"/>
+    <dgm:cxn modelId="{94A6F53F-A959-463A-BFDE-BCD7BD2076C7}" type="presOf" srcId="{E004EAC3-892D-4D06-BCF4-0F7497CBAED7}" destId="{7D002D45-449E-41FA-A465-F8A1BCB85087}" srcOrd="0" destOrd="0" presId="urn:microsoft.com/office/officeart/2005/8/layout/hierarchy3"/>
     <dgm:cxn modelId="{613F1986-7E57-4AF2-85A7-E65243CD70D9}" srcId="{39FDA24F-138C-48E7-A432-3C3A029E108F}" destId="{BCF2050A-6CF4-41D9-BFDB-CBEB5BDEB9A9}" srcOrd="4" destOrd="0" parTransId="{13A85DC6-4347-49D5-A078-7F9775AF1CCA}" sibTransId="{0F463272-1BD8-4114-AC5A-A459BCAE85F0}"/>
-    <dgm:cxn modelId="{F58B6068-ECE4-4C95-B585-6B52C4F3F35C}" srcId="{39FDA24F-138C-48E7-A432-3C3A029E108F}" destId="{17A6E45C-EE2A-4798-A06D-BA13D3842653}" srcOrd="1" destOrd="0" parTransId="{9C56D1A5-F407-4BFF-8891-1E4682B9A6BB}" sibTransId="{AFED61C5-C621-4DFA-971A-09B52789CDA5}"/>
     <dgm:cxn modelId="{35D4D249-7BE0-4D85-BC74-347CF9F567B8}" type="presOf" srcId="{0128B625-F352-4AE1-8577-E5DD8B8B0CEF}" destId="{85D5FB6B-1383-4EC5-9E55-CFEB19ABE3AC}" srcOrd="0" destOrd="0" presId="urn:microsoft.com/office/officeart/2005/8/layout/hierarchy3"/>
-    <dgm:cxn modelId="{1184BBF4-BA60-40FD-A90A-52847CEB3790}" type="presOf" srcId="{BDC5DD6A-FBC1-452C-BC24-39E295EAC0FA}" destId="{45C9E3B2-A04B-4DC6-809E-69771C933CAA}" srcOrd="0" destOrd="0" presId="urn:microsoft.com/office/officeart/2005/8/layout/hierarchy3"/>
-    <dgm:cxn modelId="{9D31C92C-FB50-4B36-B4BD-11C11F05DF88}" srcId="{15272A79-60DF-40A4-B348-5BAB6C0BC3F5}" destId="{55CAD101-5EBD-40E8-8B5A-CAC19CD99886}" srcOrd="1" destOrd="0" parTransId="{0F7F6826-E5B7-476D-AE81-C581B5795770}" sibTransId="{3932FC0E-F4D0-4A04-A36F-BB3E6C1CD3FF}"/>
+    <dgm:cxn modelId="{DA6471BB-F64B-420A-BA62-5832C001951F}" type="presOf" srcId="{383EA88D-F27F-48E2-846D-CE64EB6DB950}" destId="{FB27F7C6-3194-4465-A21B-30DCAEFAEAFA}" srcOrd="0" destOrd="0" presId="urn:microsoft.com/office/officeart/2005/8/layout/hierarchy3"/>
+    <dgm:cxn modelId="{1C25B7EB-51BA-418B-A7FA-BD466302A406}" type="presOf" srcId="{0FE8BEC8-EF9F-47A1-A35C-AE60F2A47E8F}" destId="{E3DA2CC9-3B8F-4405-97EB-7575332029EE}" srcOrd="0" destOrd="0" presId="urn:microsoft.com/office/officeart/2005/8/layout/hierarchy3"/>
+    <dgm:cxn modelId="{69C07F8A-89FA-4C9B-BFA0-45A36FA00506}" type="presOf" srcId="{5D15E235-DCB4-4BA9-A04F-98873F0D1FF2}" destId="{7B92686B-B878-4420-9FFF-6C568E53922E}" srcOrd="0" destOrd="0" presId="urn:microsoft.com/office/officeart/2005/8/layout/hierarchy3"/>
+    <dgm:cxn modelId="{3E7DCB03-C04E-4E06-81C7-227CEA893005}" type="presOf" srcId="{BDC5DD6A-FBC1-452C-BC24-39E295EAC0FA}" destId="{65C98AE3-0256-43BD-8102-79F7579AD1CC}" srcOrd="1" destOrd="0" presId="urn:microsoft.com/office/officeart/2005/8/layout/hierarchy3"/>
+    <dgm:cxn modelId="{13AB4314-6B90-4BB6-ACF0-829825737864}" type="presOf" srcId="{F8F4FC1B-B140-4F14-82FF-36B85734F91B}" destId="{18254FBB-1D23-42B4-90F9-085BC0F972EE}" srcOrd="0" destOrd="0" presId="urn:microsoft.com/office/officeart/2005/8/layout/hierarchy3"/>
+    <dgm:cxn modelId="{8A0260D3-6DC8-48B5-85E6-0530CF69A8FA}" type="presOf" srcId="{15272A79-60DF-40A4-B348-5BAB6C0BC3F5}" destId="{270E55B0-DC72-40E4-87E5-83D20D775D05}" srcOrd="1" destOrd="0" presId="urn:microsoft.com/office/officeart/2005/8/layout/hierarchy3"/>
+    <dgm:cxn modelId="{48F3F4E7-0F50-4D33-A12A-CF1E607FB3A4}" type="presOf" srcId="{2BD759C1-3483-4407-9E3A-42F763C9184F}" destId="{6A887FEE-D103-40AD-A264-84B281EE545B}" srcOrd="0" destOrd="0" presId="urn:microsoft.com/office/officeart/2005/8/layout/hierarchy3"/>
+    <dgm:cxn modelId="{3F7BBD64-64C5-4DE4-A772-382FC6F4B02A}" type="presOf" srcId="{BCF2050A-6CF4-41D9-BFDB-CBEB5BDEB9A9}" destId="{E744A470-931F-4D2A-8319-779D901074D2}" srcOrd="1" destOrd="0" presId="urn:microsoft.com/office/officeart/2005/8/layout/hierarchy3"/>
+    <dgm:cxn modelId="{E43F90DA-5540-465B-A878-3D5CE66551AF}" type="presOf" srcId="{64734B80-4221-45AE-B960-4184FEF7FC2B}" destId="{D17D5AF5-7E93-4B8C-97D2-26EACFB01BAD}" srcOrd="0" destOrd="0" presId="urn:microsoft.com/office/officeart/2005/8/layout/hierarchy3"/>
+    <dgm:cxn modelId="{5092160B-217A-4413-892B-D21E5E59A899}" srcId="{5C80EC14-A851-429A-9EF2-7FD38B0FCB58}" destId="{0128B625-F352-4AE1-8577-E5DD8B8B0CEF}" srcOrd="1" destOrd="0" parTransId="{B2DD471D-D666-467A-8951-217EE2C5A09F}" sibTransId="{DE8368C6-DE40-4E53-B2E5-CF75B6F5DF79}"/>
+    <dgm:cxn modelId="{50A611F5-D772-4E7B-BC48-F0C7F777ADE9}" type="presOf" srcId="{F01F5FED-312C-4C24-B701-8D3A60F0F6CD}" destId="{E0404AF7-7BDF-424F-9EB5-467295A8F517}" srcOrd="0" destOrd="0" presId="urn:microsoft.com/office/officeart/2005/8/layout/hierarchy3"/>
     <dgm:cxn modelId="{FAEEA256-6EB0-4355-9B35-2F2311DCB43F}" type="presOf" srcId="{C02B70D0-C3F9-4F66-A627-2F7D55ECD773}" destId="{11DFA63A-B308-475B-92F7-5BE32F16486E}" srcOrd="0" destOrd="0" presId="urn:microsoft.com/office/officeart/2005/8/layout/hierarchy3"/>
-    <dgm:cxn modelId="{3E7DCB03-C04E-4E06-81C7-227CEA893005}" type="presOf" srcId="{BDC5DD6A-FBC1-452C-BC24-39E295EAC0FA}" destId="{65C98AE3-0256-43BD-8102-79F7579AD1CC}" srcOrd="1" destOrd="0" presId="urn:microsoft.com/office/officeart/2005/8/layout/hierarchy3"/>
-    <dgm:cxn modelId="{8A0260D3-6DC8-48B5-85E6-0530CF69A8FA}" type="presOf" srcId="{15272A79-60DF-40A4-B348-5BAB6C0BC3F5}" destId="{270E55B0-DC72-40E4-87E5-83D20D775D05}" srcOrd="1" destOrd="0" presId="urn:microsoft.com/office/officeart/2005/8/layout/hierarchy3"/>
-    <dgm:cxn modelId="{08470EC9-7BD8-431B-839E-9C5DE67F5EBB}" srcId="{5C80EC14-A851-429A-9EF2-7FD38B0FCB58}" destId="{E004EAC3-892D-4D06-BCF4-0F7497CBAED7}" srcOrd="3" destOrd="0" parTransId="{145B9685-B495-41F8-B7E9-1AAB2FF5C287}" sibTransId="{6DE1D02F-2D74-4D83-8346-3CF652A1664E}"/>
-    <dgm:cxn modelId="{B40B52F7-447E-4587-ADD7-78443446071E}" srcId="{39FDA24F-138C-48E7-A432-3C3A029E108F}" destId="{15272A79-60DF-40A4-B348-5BAB6C0BC3F5}" srcOrd="0" destOrd="0" parTransId="{3FA9233F-2BD0-4DBB-A7FF-DA82C3911C29}" sibTransId="{329467D4-12E3-4362-BBFB-B1478A101033}"/>
-    <dgm:cxn modelId="{98ABF0F2-CB5F-43A1-902C-EAFBA92A4090}" srcId="{BDC5DD6A-FBC1-452C-BC24-39E295EAC0FA}" destId="{C02B70D0-C3F9-4F66-A627-2F7D55ECD773}" srcOrd="1" destOrd="0" parTransId="{E6A33E8E-986C-4249-A22F-3BAB96789222}" sibTransId="{037DEE33-5B5D-4C93-B3D2-46717E4DD8FC}"/>
+    <dgm:cxn modelId="{BF84D40B-93CB-48D7-BC21-4BE64840FD16}" type="presOf" srcId="{39FDA24F-138C-48E7-A432-3C3A029E108F}" destId="{EECC6759-146C-4BB4-B271-B934273847AC}" srcOrd="0" destOrd="0" presId="urn:microsoft.com/office/officeart/2005/8/layout/hierarchy3"/>
+    <dgm:cxn modelId="{E90E5916-21F2-4E84-8394-2340B53BDD1E}" type="presOf" srcId="{AEAB993F-D28E-473A-8ADE-C911C7044C94}" destId="{0381B50D-39F0-48ED-8B3A-ACECAE994C4B}" srcOrd="0" destOrd="0" presId="urn:microsoft.com/office/officeart/2005/8/layout/hierarchy3"/>
+    <dgm:cxn modelId="{956B26D2-C71F-4097-B39B-8DACE8827DEB}" type="presOf" srcId="{BCF2050A-6CF4-41D9-BFDB-CBEB5BDEB9A9}" destId="{DFB62AD1-22F5-4B94-B84B-63983249E7FF}" srcOrd="0" destOrd="0" presId="urn:microsoft.com/office/officeart/2005/8/layout/hierarchy3"/>
     <dgm:cxn modelId="{E09AE534-3E8C-4A98-89B4-5461641646D9}" type="presOf" srcId="{5C80EC14-A851-429A-9EF2-7FD38B0FCB58}" destId="{7B84117B-8AC9-4555-BA6F-90AE369478F2}" srcOrd="0" destOrd="0" presId="urn:microsoft.com/office/officeart/2005/8/layout/hierarchy3"/>
-    <dgm:cxn modelId="{DDEA500C-77D6-4275-BCD4-12C46688332A}" type="presOf" srcId="{91152576-169B-40BE-8E62-7FF0BE953AEB}" destId="{3EA98D33-FBD9-47BF-AA9F-7A1AEC1706E9}" srcOrd="0" destOrd="0" presId="urn:microsoft.com/office/officeart/2005/8/layout/hierarchy3"/>
-    <dgm:cxn modelId="{927FA1E2-6399-463A-8AA7-FF30047E7B7B}" srcId="{5C80EC14-A851-429A-9EF2-7FD38B0FCB58}" destId="{F8F4FC1B-B140-4F14-82FF-36B85734F91B}" srcOrd="0" destOrd="0" parTransId="{E77B18D4-DBB3-4B4C-97DE-DDCCFACF5444}" sibTransId="{75F201D2-694C-4E76-A51F-D012EAF1D6F5}"/>
-    <dgm:cxn modelId="{09F15249-5438-464D-8948-56FF98D2B1EF}" type="presOf" srcId="{5C80EC14-A851-429A-9EF2-7FD38B0FCB58}" destId="{3F25274A-31E6-4BF1-84FF-030C007C9A8E}" srcOrd="1" destOrd="0" presId="urn:microsoft.com/office/officeart/2005/8/layout/hierarchy3"/>
-    <dgm:cxn modelId="{C99CF8B0-2CD1-4DEE-9B66-4896DDF84CF5}" type="presOf" srcId="{E77B18D4-DBB3-4B4C-97DE-DDCCFACF5444}" destId="{0D4E001A-690B-4347-AA0B-CC209DA191F7}" srcOrd="0" destOrd="0" presId="urn:microsoft.com/office/officeart/2005/8/layout/hierarchy3"/>
-    <dgm:cxn modelId="{1C25B7EB-51BA-418B-A7FA-BD466302A406}" type="presOf" srcId="{0FE8BEC8-EF9F-47A1-A35C-AE60F2A47E8F}" destId="{E3DA2CC9-3B8F-4405-97EB-7575332029EE}" srcOrd="0" destOrd="0" presId="urn:microsoft.com/office/officeart/2005/8/layout/hierarchy3"/>
-    <dgm:cxn modelId="{E90E5916-21F2-4E84-8394-2340B53BDD1E}" type="presOf" srcId="{AEAB993F-D28E-473A-8ADE-C911C7044C94}" destId="{0381B50D-39F0-48ED-8B3A-ACECAE994C4B}" srcOrd="0" destOrd="0" presId="urn:microsoft.com/office/officeart/2005/8/layout/hierarchy3"/>
-    <dgm:cxn modelId="{9374A8DD-8E69-467B-82E6-6021361A27A9}" srcId="{15272A79-60DF-40A4-B348-5BAB6C0BC3F5}" destId="{5D15E235-DCB4-4BA9-A04F-98873F0D1FF2}" srcOrd="2" destOrd="0" parTransId="{F01F5FED-312C-4C24-B701-8D3A60F0F6CD}" sibTransId="{63C42624-FBB5-4EBB-BCF3-B3802EEEFA07}"/>
-    <dgm:cxn modelId="{C03A30AD-4A08-4FB8-B8A6-32C8726D2D8F}" type="presOf" srcId="{17A6E45C-EE2A-4798-A06D-BA13D3842653}" destId="{EA2398BB-27C2-4FC5-8E19-A4BAA978B73A}" srcOrd="0" destOrd="0" presId="urn:microsoft.com/office/officeart/2005/8/layout/hierarchy3"/>
-    <dgm:cxn modelId="{DA6471BB-F64B-420A-BA62-5832C001951F}" type="presOf" srcId="{383EA88D-F27F-48E2-846D-CE64EB6DB950}" destId="{FB27F7C6-3194-4465-A21B-30DCAEFAEAFA}" srcOrd="0" destOrd="0" presId="urn:microsoft.com/office/officeart/2005/8/layout/hierarchy3"/>
-    <dgm:cxn modelId="{3F7BBD64-64C5-4DE4-A772-382FC6F4B02A}" type="presOf" srcId="{BCF2050A-6CF4-41D9-BFDB-CBEB5BDEB9A9}" destId="{E744A470-931F-4D2A-8319-779D901074D2}" srcOrd="1" destOrd="0" presId="urn:microsoft.com/office/officeart/2005/8/layout/hierarchy3"/>
-    <dgm:cxn modelId="{A0607FC2-BB43-45B4-B11E-4AB994B88C9E}" type="presOf" srcId="{FFD06E6D-CE14-440F-BF47-1763BFC2D015}" destId="{BCA81C53-7FE8-4D45-8C27-F68782FE2FBE}" srcOrd="0" destOrd="0" presId="urn:microsoft.com/office/officeart/2005/8/layout/hierarchy3"/>
-    <dgm:cxn modelId="{D96FEDCA-4B78-41CC-B556-B3711445AC82}" type="presOf" srcId="{31A4B967-3DFF-43A0-A822-CF6D298BC388}" destId="{D5DCF584-2416-4841-8A19-70255E1ABC54}" srcOrd="0" destOrd="0" presId="urn:microsoft.com/office/officeart/2005/8/layout/hierarchy3"/>
+    <dgm:cxn modelId="{17FF6462-DA69-4E2A-96EB-5DBC65834431}" srcId="{BCF2050A-6CF4-41D9-BFDB-CBEB5BDEB9A9}" destId="{FFD06E6D-CE14-440F-BF47-1763BFC2D015}" srcOrd="0" destOrd="0" parTransId="{2BD759C1-3483-4407-9E3A-42F763C9184F}" sibTransId="{D0572F99-6B5C-451B-A0CD-59CCC49D4EF5}"/>
     <dgm:cxn modelId="{FC260462-B434-4BC9-9529-66F459CAF7E6}" srcId="{BDC5DD6A-FBC1-452C-BC24-39E295EAC0FA}" destId="{64734B80-4221-45AE-B960-4184FEF7FC2B}" srcOrd="0" destOrd="0" parTransId="{91152576-169B-40BE-8E62-7FF0BE953AEB}" sibTransId="{134527BA-9982-47C0-B246-1C2D95DB8F4C}"/>
-    <dgm:cxn modelId="{D02CA1F1-9459-4207-9BCB-277ED87C0D0F}" type="presOf" srcId="{55CAD101-5EBD-40E8-8B5A-CAC19CD99886}" destId="{15EC8C5A-02E9-4D4D-8441-4CFDE7C72B7D}" srcOrd="0" destOrd="0" presId="urn:microsoft.com/office/officeart/2005/8/layout/hierarchy3"/>
-    <dgm:cxn modelId="{13AB4314-6B90-4BB6-ACF0-829825737864}" type="presOf" srcId="{F8F4FC1B-B140-4F14-82FF-36B85734F91B}" destId="{18254FBB-1D23-42B4-90F9-085BC0F972EE}" srcOrd="0" destOrd="0" presId="urn:microsoft.com/office/officeart/2005/8/layout/hierarchy3"/>
-    <dgm:cxn modelId="{5DF9444B-F1D5-4E4D-9C97-F9021825D853}" srcId="{39FDA24F-138C-48E7-A432-3C3A029E108F}" destId="{5C80EC14-A851-429A-9EF2-7FD38B0FCB58}" srcOrd="2" destOrd="0" parTransId="{5FD6C2C4-50C3-425F-97C2-BF96E7F552B4}" sibTransId="{86CA18CE-D82C-4E25-9C73-1A1F7090ADBC}"/>
-    <dgm:cxn modelId="{C0B5B93B-A92B-4949-AD96-B23CDA709C40}" srcId="{39FDA24F-138C-48E7-A432-3C3A029E108F}" destId="{BDC5DD6A-FBC1-452C-BC24-39E295EAC0FA}" srcOrd="3" destOrd="0" parTransId="{5570B5B0-FBDB-4EA6-A1E8-48FDA3363E9E}" sibTransId="{B58A1015-A8DA-4495-9952-030B07DD4AE6}"/>
-    <dgm:cxn modelId="{956B26D2-C71F-4097-B39B-8DACE8827DEB}" type="presOf" srcId="{BCF2050A-6CF4-41D9-BFDB-CBEB5BDEB9A9}" destId="{DFB62AD1-22F5-4B94-B84B-63983249E7FF}" srcOrd="0" destOrd="0" presId="urn:microsoft.com/office/officeart/2005/8/layout/hierarchy3"/>
-    <dgm:cxn modelId="{DB8DFAB2-B2D9-48C1-903F-21C2B016DD99}" type="presOf" srcId="{145B9685-B495-41F8-B7E9-1AAB2FF5C287}" destId="{ECF08292-B0AA-4C0B-9B62-A7A6E9B67D01}" srcOrd="0" destOrd="0" presId="urn:microsoft.com/office/officeart/2005/8/layout/hierarchy3"/>
-    <dgm:cxn modelId="{E43F90DA-5540-465B-A878-3D5CE66551AF}" type="presOf" srcId="{64734B80-4221-45AE-B960-4184FEF7FC2B}" destId="{D17D5AF5-7E93-4B8C-97D2-26EACFB01BAD}" srcOrd="0" destOrd="0" presId="urn:microsoft.com/office/officeart/2005/8/layout/hierarchy3"/>
-    <dgm:cxn modelId="{28210463-3BD2-4DBA-9B91-97F9CA5D0601}" type="presOf" srcId="{B2DD471D-D666-467A-8951-217EE2C5A09F}" destId="{CEB46391-533D-4055-9F38-D2F5B64EE6F8}" srcOrd="0" destOrd="0" presId="urn:microsoft.com/office/officeart/2005/8/layout/hierarchy3"/>
-    <dgm:cxn modelId="{19B1A30A-7E2F-4D91-A3EA-ED36411045E0}" srcId="{17A6E45C-EE2A-4798-A06D-BA13D3842653}" destId="{9FA41D54-3C44-4829-B8AA-F8CCC8F6F5E8}" srcOrd="1" destOrd="0" parTransId="{3A814798-0F51-4369-A541-5218E9C84051}" sibTransId="{C23DDEF2-18C6-41A9-B7ED-CCBF4840C2A0}"/>
-    <dgm:cxn modelId="{18289599-A311-4051-9045-647C4837F979}" type="presOf" srcId="{9FA41D54-3C44-4829-B8AA-F8CCC8F6F5E8}" destId="{BE982601-11BC-4250-868C-A837261AAF8F}" srcOrd="0" destOrd="0" presId="urn:microsoft.com/office/officeart/2005/8/layout/hierarchy3"/>
-    <dgm:cxn modelId="{17FF6462-DA69-4E2A-96EB-5DBC65834431}" srcId="{BCF2050A-6CF4-41D9-BFDB-CBEB5BDEB9A9}" destId="{FFD06E6D-CE14-440F-BF47-1763BFC2D015}" srcOrd="0" destOrd="0" parTransId="{2BD759C1-3483-4407-9E3A-42F763C9184F}" sibTransId="{D0572F99-6B5C-451B-A0CD-59CCC49D4EF5}"/>
-    <dgm:cxn modelId="{48F3F4E7-0F50-4D33-A12A-CF1E607FB3A4}" type="presOf" srcId="{2BD759C1-3483-4407-9E3A-42F763C9184F}" destId="{6A887FEE-D103-40AD-A264-84B281EE545B}" srcOrd="0" destOrd="0" presId="urn:microsoft.com/office/officeart/2005/8/layout/hierarchy3"/>
-    <dgm:cxn modelId="{5092160B-217A-4413-892B-D21E5E59A899}" srcId="{5C80EC14-A851-429A-9EF2-7FD38B0FCB58}" destId="{0128B625-F352-4AE1-8577-E5DD8B8B0CEF}" srcOrd="1" destOrd="0" parTransId="{B2DD471D-D666-467A-8951-217EE2C5A09F}" sibTransId="{DE8368C6-DE40-4E53-B2E5-CF75B6F5DF79}"/>
-    <dgm:cxn modelId="{9DB5DDAF-25AE-4B59-AA5B-3A6AC85DF828}" type="presOf" srcId="{15272A79-60DF-40A4-B348-5BAB6C0BC3F5}" destId="{31A64678-7AC5-44A3-9918-A16B84986BB4}" srcOrd="0" destOrd="0" presId="urn:microsoft.com/office/officeart/2005/8/layout/hierarchy3"/>
-    <dgm:cxn modelId="{7F129350-677D-4F64-B542-CCF694D1A43D}" type="presOf" srcId="{8346E337-662F-470B-9F93-1D76D4468326}" destId="{E57152C6-7A38-4611-8406-AA547F40C188}" srcOrd="0" destOrd="0" presId="urn:microsoft.com/office/officeart/2005/8/layout/hierarchy3"/>
-    <dgm:cxn modelId="{45933BFE-2CF1-474B-963E-902F09FB4A32}" type="presOf" srcId="{17A6E45C-EE2A-4798-A06D-BA13D3842653}" destId="{CD49FC6E-E5EE-43D6-A400-6877C924B49A}" srcOrd="1" destOrd="0" presId="urn:microsoft.com/office/officeart/2005/8/layout/hierarchy3"/>
-    <dgm:cxn modelId="{03D592AA-7635-4335-8323-3F58D1B1866E}" type="presOf" srcId="{0F7F6826-E5B7-476D-AE81-C581B5795770}" destId="{AB1F32A4-68AD-4F42-88E4-F15D6594CF80}" srcOrd="0" destOrd="0" presId="urn:microsoft.com/office/officeart/2005/8/layout/hierarchy3"/>
-    <dgm:cxn modelId="{CB04CE9E-FBB5-4E2F-ACF6-5DF3167F0A9F}" type="presOf" srcId="{3A814798-0F51-4369-A541-5218E9C84051}" destId="{2C1186A4-F3B3-4E48-A1A2-52FC1BAED6C8}" srcOrd="0" destOrd="0" presId="urn:microsoft.com/office/officeart/2005/8/layout/hierarchy3"/>
     <dgm:cxn modelId="{BA760CA8-9411-47B5-A210-41C7E94002D7}" srcId="{17A6E45C-EE2A-4798-A06D-BA13D3842653}" destId="{8346E337-662F-470B-9F93-1D76D4468326}" srcOrd="0" destOrd="0" parTransId="{383EA88D-F27F-48E2-846D-CE64EB6DB950}" sibTransId="{843989D1-DF2F-444C-9B00-4FB251130AA4}"/>
-    <dgm:cxn modelId="{8DCCCF97-9BE1-41D2-A762-40B6362E744B}" type="presOf" srcId="{E6A33E8E-986C-4249-A22F-3BAB96789222}" destId="{3D76A59B-2757-4825-AF33-DD7D5CAFCA6B}" srcOrd="0" destOrd="0" presId="urn:microsoft.com/office/officeart/2005/8/layout/hierarchy3"/>
-    <dgm:cxn modelId="{A618DEBC-FEB3-4540-B820-B96623A3DD91}" srcId="{15272A79-60DF-40A4-B348-5BAB6C0BC3F5}" destId="{0FE8BEC8-EF9F-47A1-A35C-AE60F2A47E8F}" srcOrd="0" destOrd="0" parTransId="{31A4B967-3DFF-43A0-A822-CF6D298BC388}" sibTransId="{2D0C1090-4A44-4DAF-9A45-D94417BD7138}"/>
-    <dgm:cxn modelId="{69C07F8A-89FA-4C9B-BFA0-45A36FA00506}" type="presOf" srcId="{5D15E235-DCB4-4BA9-A04F-98873F0D1FF2}" destId="{7B92686B-B878-4420-9FFF-6C568E53922E}" srcOrd="0" destOrd="0" presId="urn:microsoft.com/office/officeart/2005/8/layout/hierarchy3"/>
-    <dgm:cxn modelId="{94A6F53F-A959-463A-BFDE-BCD7BD2076C7}" type="presOf" srcId="{E004EAC3-892D-4D06-BCF4-0F7497CBAED7}" destId="{7D002D45-449E-41FA-A465-F8A1BCB85087}" srcOrd="0" destOrd="0" presId="urn:microsoft.com/office/officeart/2005/8/layout/hierarchy3"/>
-    <dgm:cxn modelId="{3B9D3584-1791-4DBA-9B5E-8BC33FFD910C}" srcId="{5C80EC14-A851-429A-9EF2-7FD38B0FCB58}" destId="{4BA69AC7-8F33-4A12-BB23-8CBEF84AE135}" srcOrd="2" destOrd="0" parTransId="{AEAB993F-D28E-473A-8ADE-C911C7044C94}" sibTransId="{CCC8B79D-75DE-4244-848D-CB150C8A7175}"/>
-    <dgm:cxn modelId="{BF84D40B-93CB-48D7-BC21-4BE64840FD16}" type="presOf" srcId="{39FDA24F-138C-48E7-A432-3C3A029E108F}" destId="{EECC6759-146C-4BB4-B271-B934273847AC}" srcOrd="0" destOrd="0" presId="urn:microsoft.com/office/officeart/2005/8/layout/hierarchy3"/>
-    <dgm:cxn modelId="{50A611F5-D772-4E7B-BC48-F0C7F777ADE9}" type="presOf" srcId="{F01F5FED-312C-4C24-B701-8D3A60F0F6CD}" destId="{E0404AF7-7BDF-424F-9EB5-467295A8F517}" srcOrd="0" destOrd="0" presId="urn:microsoft.com/office/officeart/2005/8/layout/hierarchy3"/>
-    <dgm:cxn modelId="{CC9E8E3D-1831-41E5-935D-C6B608516E24}" type="presOf" srcId="{4BA69AC7-8F33-4A12-BB23-8CBEF84AE135}" destId="{1BF05B23-31E5-4145-8F1D-9797DCBCA142}" srcOrd="0" destOrd="0" presId="urn:microsoft.com/office/officeart/2005/8/layout/hierarchy3"/>
     <dgm:cxn modelId="{26709120-E03D-4302-90F8-0593443BAC33}" type="presParOf" srcId="{EECC6759-146C-4BB4-B271-B934273847AC}" destId="{AB8FAD93-DB62-4835-BF90-F1C3C24E1A07}" srcOrd="0" destOrd="0" presId="urn:microsoft.com/office/officeart/2005/8/layout/hierarchy3"/>
     <dgm:cxn modelId="{EFD00BF3-C1F4-4656-968D-84E708E113E0}" type="presParOf" srcId="{AB8FAD93-DB62-4835-BF90-F1C3C24E1A07}" destId="{13AAE006-2F13-4090-9573-E4BD2DE2FE0B}" srcOrd="0" destOrd="0" presId="urn:microsoft.com/office/officeart/2005/8/layout/hierarchy3"/>
     <dgm:cxn modelId="{1DF8ED1D-C7F2-40E6-9952-9F4268EEF637}" type="presParOf" srcId="{13AAE006-2F13-4090-9573-E4BD2DE2FE0B}" destId="{31A64678-7AC5-44A3-9918-A16B84986BB4}" srcOrd="0" destOrd="0" presId="urn:microsoft.com/office/officeart/2005/8/layout/hierarchy3"/>
@@ -22168,7 +22168,7 @@
           <a:p>
             <a:fld id="{5E98ECC7-4684-4B1D-A9E4-C1CABE848CA3}" type="datetimeFigureOut">
               <a:rPr lang="en-US" smtClean="0"/>
-              <a:t>11/4/2015</a:t>
+              <a:t>11/5/2015</a:t>
             </a:fld>
             <a:endParaRPr lang="en-US" dirty="0"/>
           </a:p>
@@ -22651,7 +22651,7 @@
           <a:p>
             <a:fld id="{8A0151A0-6BDA-4C61-94E2-4A05776C8C41}" type="datetime1">
               <a:rPr lang="en-US" smtClean="0"/>
-              <a:t>11/4/2015</a:t>
+              <a:t>11/5/2015</a:t>
             </a:fld>
             <a:endParaRPr lang="en-US" dirty="0"/>
           </a:p>
@@ -22821,7 +22821,7 @@
           <a:p>
             <a:fld id="{2E35788B-17C6-4432-AE26-BE836522A606}" type="datetime1">
               <a:rPr lang="en-US" smtClean="0"/>
-              <a:t>11/4/2015</a:t>
+              <a:t>11/5/2015</a:t>
             </a:fld>
             <a:endParaRPr lang="en-US" dirty="0"/>
           </a:p>
@@ -23001,7 +23001,7 @@
           <a:p>
             <a:fld id="{744D1FCA-C735-450D-BCA4-DB50B38ECD50}" type="datetime1">
               <a:rPr lang="en-US" smtClean="0"/>
-              <a:t>11/4/2015</a:t>
+              <a:t>11/5/2015</a:t>
             </a:fld>
             <a:endParaRPr lang="en-US" dirty="0"/>
           </a:p>
@@ -23171,7 +23171,7 @@
           <a:p>
             <a:fld id="{D47A2ED5-CD2A-4B3B-A81F-BE7A26036022}" type="datetime1">
               <a:rPr lang="en-US" smtClean="0"/>
-              <a:t>11/4/2015</a:t>
+              <a:t>11/5/2015</a:t>
             </a:fld>
             <a:endParaRPr lang="en-US" dirty="0"/>
           </a:p>
@@ -23415,7 +23415,7 @@
           <a:p>
             <a:fld id="{AFC2F17C-2319-45BC-B339-E7F83AB38139}" type="datetime1">
               <a:rPr lang="en-US" smtClean="0"/>
-              <a:t>11/4/2015</a:t>
+              <a:t>11/5/2015</a:t>
             </a:fld>
             <a:endParaRPr lang="en-US" dirty="0"/>
           </a:p>
@@ -23647,7 +23647,7 @@
           <a:p>
             <a:fld id="{7DF8D633-0327-407C-B754-C6DC287DA074}" type="datetime1">
               <a:rPr lang="en-US" smtClean="0"/>
-              <a:t>11/4/2015</a:t>
+              <a:t>11/5/2015</a:t>
             </a:fld>
             <a:endParaRPr lang="en-US" dirty="0"/>
           </a:p>
@@ -24014,7 +24014,7 @@
           <a:p>
             <a:fld id="{76880105-B802-41CD-BB85-298F26006685}" type="datetime1">
               <a:rPr lang="en-US" smtClean="0"/>
-              <a:t>11/4/2015</a:t>
+              <a:t>11/5/2015</a:t>
             </a:fld>
             <a:endParaRPr lang="en-US" dirty="0"/>
           </a:p>
@@ -24132,7 +24132,7 @@
           <a:p>
             <a:fld id="{162ED92B-9A44-474F-9138-A07C93ABC7FA}" type="datetime1">
               <a:rPr lang="en-US" smtClean="0"/>
-              <a:t>11/4/2015</a:t>
+              <a:t>11/5/2015</a:t>
             </a:fld>
             <a:endParaRPr lang="en-US" dirty="0"/>
           </a:p>
@@ -24227,7 +24227,7 @@
           <a:p>
             <a:fld id="{E496C444-E933-4D80-86C4-BADA1A19B898}" type="datetime1">
               <a:rPr lang="en-US" smtClean="0"/>
-              <a:t>11/4/2015</a:t>
+              <a:t>11/5/2015</a:t>
             </a:fld>
             <a:endParaRPr lang="en-US" dirty="0"/>
           </a:p>
@@ -24504,7 +24504,7 @@
           <a:p>
             <a:fld id="{FE2B3545-A360-469D-AF72-EC598B36A1A0}" type="datetime1">
               <a:rPr lang="en-US" smtClean="0"/>
-              <a:t>11/4/2015</a:t>
+              <a:t>11/5/2015</a:t>
             </a:fld>
             <a:endParaRPr lang="en-US" dirty="0"/>
           </a:p>
@@ -24761,7 +24761,7 @@
           <a:p>
             <a:fld id="{E5CD081C-AF44-4D3A-9989-1BD7F6EBBAB7}" type="datetime1">
               <a:rPr lang="en-US" smtClean="0"/>
-              <a:t>11/4/2015</a:t>
+              <a:t>11/5/2015</a:t>
             </a:fld>
             <a:endParaRPr lang="en-US" dirty="0"/>
           </a:p>
@@ -24983,7 +24983,7 @@
           <a:p>
             <a:fld id="{A7C17880-5397-45FB-B1C0-5FB7CBED16B5}" type="datetime1">
               <a:rPr lang="en-US" smtClean="0"/>
-              <a:t>11/4/2015</a:t>
+              <a:t>11/5/2015</a:t>
             </a:fld>
             <a:endParaRPr lang="en-US" dirty="0"/>
           </a:p>
@@ -26762,8 +26762,9 @@
           <a:p>
             <a:r>
               <a:rPr lang="en-US" dirty="0" smtClean="0"/>
-              <a:t>Compensations</a:t>
+              <a:t>Complex Compensations</a:t>
             </a:r>
+            <a:endParaRPr lang="en-US" dirty="0" smtClean="0"/>
           </a:p>
           <a:p>
             <a:r>
@@ -26773,14 +26774,16 @@
           </a:p>
           <a:p>
             <a:r>
-              <a:rPr lang="en-US" dirty="0" smtClean="0"/>
-              <a:t>Configuration Management</a:t>
+              <a:rPr lang="en-US" dirty="0" err="1" smtClean="0"/>
+              <a:t>RabbitMQ</a:t>
             </a:r>
-          </a:p>
-          <a:p>
             <a:r>
               <a:rPr lang="en-US" dirty="0" smtClean="0"/>
-              <a:t>RabbitMQ and Azure SB</a:t>
+              <a:t> </a:t>
+            </a:r>
+            <a:r>
+              <a:rPr lang="en-US" dirty="0" smtClean="0"/>
+              <a:t>and Azure SB</a:t>
             </a:r>
           </a:p>
           <a:p>
@@ -26792,7 +26795,11 @@
           <a:p>
             <a:r>
               <a:rPr lang="en-US" dirty="0" smtClean="0"/>
-              <a:t>Many Other…</a:t>
+              <a:t>Many </a:t>
+            </a:r>
+            <a:r>
+              <a:rPr lang="en-US" dirty="0" smtClean="0"/>
+              <a:t>Other…</a:t>
             </a:r>
             <a:endParaRPr lang="en-US" dirty="0"/>
           </a:p>

</xml_diff>